<commit_message>
Chap02: alpha to be proofread
</commit_message>
<xml_diff>
--- a/02-GrowthQDs/Pictures/MapEfield.pptx
+++ b/02-GrowthQDs/Pictures/MapEfield.pptx
@@ -288,7 +288,7 @@
           <a:p>
             <a:fld id="{3188249C-4BA3-4338-8D91-035235D4C769}" type="datetimeFigureOut">
               <a:rPr lang="fr-FR" smtClean="0"/>
-              <a:t>28/08/2017</a:t>
+              <a:t>01/09/2017</a:t>
             </a:fld>
             <a:endParaRPr lang="fr-FR"/>
           </a:p>
@@ -458,7 +458,7 @@
           <a:p>
             <a:fld id="{3188249C-4BA3-4338-8D91-035235D4C769}" type="datetimeFigureOut">
               <a:rPr lang="fr-FR" smtClean="0"/>
-              <a:t>28/08/2017</a:t>
+              <a:t>01/09/2017</a:t>
             </a:fld>
             <a:endParaRPr lang="fr-FR"/>
           </a:p>
@@ -638,7 +638,7 @@
           <a:p>
             <a:fld id="{3188249C-4BA3-4338-8D91-035235D4C769}" type="datetimeFigureOut">
               <a:rPr lang="fr-FR" smtClean="0"/>
-              <a:t>28/08/2017</a:t>
+              <a:t>01/09/2017</a:t>
             </a:fld>
             <a:endParaRPr lang="fr-FR"/>
           </a:p>
@@ -808,7 +808,7 @@
           <a:p>
             <a:fld id="{3188249C-4BA3-4338-8D91-035235D4C769}" type="datetimeFigureOut">
               <a:rPr lang="fr-FR" smtClean="0"/>
-              <a:t>28/08/2017</a:t>
+              <a:t>01/09/2017</a:t>
             </a:fld>
             <a:endParaRPr lang="fr-FR"/>
           </a:p>
@@ -1054,7 +1054,7 @@
           <a:p>
             <a:fld id="{3188249C-4BA3-4338-8D91-035235D4C769}" type="datetimeFigureOut">
               <a:rPr lang="fr-FR" smtClean="0"/>
-              <a:t>28/08/2017</a:t>
+              <a:t>01/09/2017</a:t>
             </a:fld>
             <a:endParaRPr lang="fr-FR"/>
           </a:p>
@@ -1342,7 +1342,7 @@
           <a:p>
             <a:fld id="{3188249C-4BA3-4338-8D91-035235D4C769}" type="datetimeFigureOut">
               <a:rPr lang="fr-FR" smtClean="0"/>
-              <a:t>28/08/2017</a:t>
+              <a:t>01/09/2017</a:t>
             </a:fld>
             <a:endParaRPr lang="fr-FR"/>
           </a:p>
@@ -1764,7 +1764,7 @@
           <a:p>
             <a:fld id="{3188249C-4BA3-4338-8D91-035235D4C769}" type="datetimeFigureOut">
               <a:rPr lang="fr-FR" smtClean="0"/>
-              <a:t>28/08/2017</a:t>
+              <a:t>01/09/2017</a:t>
             </a:fld>
             <a:endParaRPr lang="fr-FR"/>
           </a:p>
@@ -1882,7 +1882,7 @@
           <a:p>
             <a:fld id="{3188249C-4BA3-4338-8D91-035235D4C769}" type="datetimeFigureOut">
               <a:rPr lang="fr-FR" smtClean="0"/>
-              <a:t>28/08/2017</a:t>
+              <a:t>01/09/2017</a:t>
             </a:fld>
             <a:endParaRPr lang="fr-FR"/>
           </a:p>
@@ -1977,7 +1977,7 @@
           <a:p>
             <a:fld id="{3188249C-4BA3-4338-8D91-035235D4C769}" type="datetimeFigureOut">
               <a:rPr lang="fr-FR" smtClean="0"/>
-              <a:t>28/08/2017</a:t>
+              <a:t>01/09/2017</a:t>
             </a:fld>
             <a:endParaRPr lang="fr-FR"/>
           </a:p>
@@ -2254,7 +2254,7 @@
           <a:p>
             <a:fld id="{3188249C-4BA3-4338-8D91-035235D4C769}" type="datetimeFigureOut">
               <a:rPr lang="fr-FR" smtClean="0"/>
-              <a:t>28/08/2017</a:t>
+              <a:t>01/09/2017</a:t>
             </a:fld>
             <a:endParaRPr lang="fr-FR"/>
           </a:p>
@@ -2507,7 +2507,7 @@
           <a:p>
             <a:fld id="{3188249C-4BA3-4338-8D91-035235D4C769}" type="datetimeFigureOut">
               <a:rPr lang="fr-FR" smtClean="0"/>
-              <a:t>28/08/2017</a:t>
+              <a:t>01/09/2017</a:t>
             </a:fld>
             <a:endParaRPr lang="fr-FR"/>
           </a:p>
@@ -2720,7 +2720,7 @@
           <a:p>
             <a:fld id="{3188249C-4BA3-4338-8D91-035235D4C769}" type="datetimeFigureOut">
               <a:rPr lang="fr-FR" smtClean="0"/>
-              <a:t>28/08/2017</a:t>
+              <a:t>01/09/2017</a:t>
             </a:fld>
             <a:endParaRPr lang="fr-FR"/>
           </a:p>
@@ -3095,35 +3095,6 @@
           <a:chExt cx="0" cy="0"/>
         </a:xfrm>
       </p:grpSpPr>
-      <p:pic>
-        <p:nvPicPr>
-          <p:cNvPr id="46" name="Image 45"/>
-          <p:cNvPicPr>
-            <a:picLocks noChangeAspect="1"/>
-          </p:cNvPicPr>
-          <p:nvPr/>
-        </p:nvPicPr>
-        <p:blipFill rotWithShape="1">
-          <a:blip r:embed="rId3">
-            <a:extLst>
-              <a:ext uri="{28A0092B-C50C-407E-A947-70E740481C1C}">
-                <a14:useLocalDpi xmlns:a14="http://schemas.microsoft.com/office/drawing/2010/main" val="0"/>
-              </a:ext>
-            </a:extLst>
-          </a:blip>
-          <a:srcRect l="4514" t="13191" r="19930" b="35919"/>
-          <a:stretch/>
-        </p:blipFill>
-        <p:spPr>
-          <a:xfrm>
-            <a:off x="35496" y="44624"/>
-            <a:ext cx="6908800" cy="2616200"/>
-          </a:xfrm>
-          <a:prstGeom prst="rect">
-            <a:avLst/>
-          </a:prstGeom>
-        </p:spPr>
-      </p:pic>
       <p:graphicFrame>
         <p:nvGraphicFramePr>
           <p:cNvPr id="47" name="Objet 46"/>
@@ -3133,25 +3104,25 @@
           <p:nvPr>
             <p:extLst>
               <p:ext uri="{D42A27DB-BD31-4B8C-83A1-F6EECF244321}">
-                <p14:modId xmlns:p14="http://schemas.microsoft.com/office/powerpoint/2010/main" val="2708655480"/>
+                <p14:modId xmlns:p14="http://schemas.microsoft.com/office/powerpoint/2010/main" val="494615174"/>
               </p:ext>
             </p:extLst>
           </p:nvPr>
         </p:nvGraphicFramePr>
         <p:xfrm>
-          <a:off x="6861969" y="1709118"/>
+          <a:off x="6950645" y="365001"/>
           <a:ext cx="2301875" cy="1903412"/>
         </p:xfrm>
         <a:graphic>
           <a:graphicData uri="http://schemas.openxmlformats.org/presentationml/2006/ole">
             <mc:AlternateContent xmlns:mc="http://schemas.openxmlformats.org/markup-compatibility/2006">
               <mc:Choice xmlns:v="urn:schemas-microsoft-com:vml" Requires="v">
-                <p:oleObj spid="_x0000_s1038" name="Drawing" r:id="rId4" imgW="1757160" imgH="1453320" progId="Canvas.Drawing.6">
+                <p:oleObj spid="_x0000_s1041" name="Drawing" r:id="rId3" imgW="1757160" imgH="1453320" progId="Canvas.Drawing.6">
                   <p:embed/>
                 </p:oleObj>
               </mc:Choice>
               <mc:Fallback>
-                <p:oleObj name="Drawing" r:id="rId4" imgW="1757160" imgH="1453320" progId="Canvas.Drawing.6">
+                <p:oleObj name="Drawing" r:id="rId3" imgW="1757160" imgH="1453320" progId="Canvas.Drawing.6">
                   <p:embed/>
                   <p:pic>
                     <p:nvPicPr>
@@ -3162,7 +3133,7 @@
                       <p:nvPr/>
                     </p:nvPicPr>
                     <p:blipFill>
-                      <a:blip r:embed="rId5">
+                      <a:blip r:embed="rId4">
                         <a:extLst>
                           <a:ext uri="{28A0092B-C50C-407E-A947-70E740481C1C}">
                             <a14:useLocalDpi xmlns:a14="http://schemas.microsoft.com/office/drawing/2010/main" val="0"/>
@@ -3176,7 +3147,7 @@
                     </p:blipFill>
                     <p:spPr bwMode="auto">
                       <a:xfrm>
-                        <a:off x="6861969" y="1709118"/>
+                        <a:off x="6950645" y="365001"/>
                         <a:ext cx="2301875" cy="1903412"/>
                       </a:xfrm>
                       <a:prstGeom prst="rect">
@@ -3213,6 +3184,35 @@
           </a:graphicData>
         </a:graphic>
       </p:graphicFrame>
+      <p:pic>
+        <p:nvPicPr>
+          <p:cNvPr id="46" name="Image 45"/>
+          <p:cNvPicPr>
+            <a:picLocks noChangeAspect="1"/>
+          </p:cNvPicPr>
+          <p:nvPr/>
+        </p:nvPicPr>
+        <p:blipFill rotWithShape="1">
+          <a:blip r:embed="rId5">
+            <a:extLst>
+              <a:ext uri="{28A0092B-C50C-407E-A947-70E740481C1C}">
+                <a14:useLocalDpi xmlns:a14="http://schemas.microsoft.com/office/drawing/2010/main" val="0"/>
+              </a:ext>
+            </a:extLst>
+          </a:blip>
+          <a:srcRect l="4514" t="13191" r="19930" b="35919"/>
+          <a:stretch/>
+        </p:blipFill>
+        <p:spPr>
+          <a:xfrm>
+            <a:off x="-36512" y="44624"/>
+            <a:ext cx="6908800" cy="2616200"/>
+          </a:xfrm>
+          <a:prstGeom prst="rect">
+            <a:avLst/>
+          </a:prstGeom>
+        </p:spPr>
+      </p:pic>
       <p:sp>
         <p:nvSpPr>
           <p:cNvPr id="48" name="ZoneTexte 47"/>
@@ -3257,7 +3257,7 @@
         </p:nvSpPr>
         <p:spPr>
           <a:xfrm>
-            <a:off x="6931278" y="1547500"/>
+            <a:off x="7019954" y="203383"/>
             <a:ext cx="364202" cy="369332"/>
           </a:xfrm>
           <a:prstGeom prst="rect">
@@ -3313,7 +3313,7 @@
         </p:blipFill>
         <p:spPr>
           <a:xfrm>
-            <a:off x="169200" y="2708920"/>
+            <a:off x="97192" y="2708920"/>
             <a:ext cx="6810376" cy="2257425"/>
           </a:xfrm>
           <a:prstGeom prst="rect">
@@ -3349,6 +3349,1067 @@
                 <a:cs typeface="Times New Roman" pitchFamily="18" charset="0"/>
               </a:rPr>
               <a:t>b)</a:t>
+            </a:r>
+            <a:endParaRPr lang="fr-FR" dirty="0">
+              <a:latin typeface="Times New Roman" pitchFamily="18" charset="0"/>
+              <a:cs typeface="Times New Roman" pitchFamily="18" charset="0"/>
+            </a:endParaRPr>
+          </a:p>
+        </p:txBody>
+      </p:sp>
+      <p:grpSp>
+        <p:nvGrpSpPr>
+          <p:cNvPr id="8" name="Groupe 7"/>
+          <p:cNvGrpSpPr>
+            <a:grpSpLocks noChangeAspect="1"/>
+          </p:cNvGrpSpPr>
+          <p:nvPr/>
+        </p:nvGrpSpPr>
+        <p:grpSpPr>
+          <a:xfrm>
+            <a:off x="6732240" y="3252212"/>
+            <a:ext cx="2373801" cy="1104433"/>
+            <a:chOff x="4660717" y="4709567"/>
+            <a:chExt cx="4281803" cy="2031801"/>
+          </a:xfrm>
+        </p:grpSpPr>
+        <p:sp>
+          <p:nvSpPr>
+            <p:cNvPr id="9" name="Rectangle 8"/>
+            <p:cNvSpPr/>
+            <p:nvPr/>
+          </p:nvSpPr>
+          <p:spPr>
+            <a:xfrm>
+              <a:off x="5846176" y="5877272"/>
+              <a:ext cx="2232248" cy="441920"/>
+            </a:xfrm>
+            <a:prstGeom prst="rect">
+              <a:avLst/>
+            </a:prstGeom>
+            <a:solidFill>
+              <a:srgbClr val="0066CC"/>
+            </a:solidFill>
+            <a:ln>
+              <a:noFill/>
+            </a:ln>
+          </p:spPr>
+          <p:style>
+            <a:lnRef idx="2">
+              <a:schemeClr val="accent1">
+                <a:shade val="50000"/>
+              </a:schemeClr>
+            </a:lnRef>
+            <a:fillRef idx="1">
+              <a:schemeClr val="accent1"/>
+            </a:fillRef>
+            <a:effectRef idx="0">
+              <a:schemeClr val="accent1"/>
+            </a:effectRef>
+            <a:fontRef idx="minor">
+              <a:schemeClr val="lt1"/>
+            </a:fontRef>
+          </p:style>
+          <p:txBody>
+            <a:bodyPr rtlCol="0" anchor="ctr"/>
+            <a:lstStyle/>
+            <a:p>
+              <a:pPr algn="ctr"/>
+              <a:endParaRPr lang="en-US"/>
+            </a:p>
+          </p:txBody>
+        </p:sp>
+        <p:sp>
+          <p:nvSpPr>
+            <p:cNvPr id="10" name="Rectangle 9"/>
+            <p:cNvSpPr/>
+            <p:nvPr/>
+          </p:nvSpPr>
+          <p:spPr>
+            <a:xfrm>
+              <a:off x="5846176" y="5615529"/>
+              <a:ext cx="2232248" cy="45719"/>
+            </a:xfrm>
+            <a:prstGeom prst="rect">
+              <a:avLst/>
+            </a:prstGeom>
+            <a:solidFill>
+              <a:srgbClr val="FF0000"/>
+            </a:solidFill>
+            <a:ln>
+              <a:noFill/>
+            </a:ln>
+          </p:spPr>
+          <p:style>
+            <a:lnRef idx="2">
+              <a:schemeClr val="accent1">
+                <a:shade val="50000"/>
+              </a:schemeClr>
+            </a:lnRef>
+            <a:fillRef idx="1">
+              <a:schemeClr val="accent1"/>
+            </a:fillRef>
+            <a:effectRef idx="0">
+              <a:schemeClr val="accent1"/>
+            </a:effectRef>
+            <a:fontRef idx="minor">
+              <a:schemeClr val="lt1"/>
+            </a:fontRef>
+          </p:style>
+          <p:txBody>
+            <a:bodyPr rtlCol="0" anchor="ctr"/>
+            <a:lstStyle/>
+            <a:p>
+              <a:pPr algn="ctr"/>
+              <a:endParaRPr lang="en-US"/>
+            </a:p>
+          </p:txBody>
+        </p:sp>
+        <p:sp>
+          <p:nvSpPr>
+            <p:cNvPr id="11" name="Ellipse 10"/>
+            <p:cNvSpPr/>
+            <p:nvPr/>
+          </p:nvSpPr>
+          <p:spPr>
+            <a:xfrm>
+              <a:off x="5950692" y="5517232"/>
+              <a:ext cx="216024" cy="144016"/>
+            </a:xfrm>
+            <a:prstGeom prst="ellipse">
+              <a:avLst/>
+            </a:prstGeom>
+            <a:solidFill>
+              <a:srgbClr val="FF0000"/>
+            </a:solidFill>
+            <a:ln>
+              <a:noFill/>
+            </a:ln>
+          </p:spPr>
+          <p:style>
+            <a:lnRef idx="2">
+              <a:schemeClr val="accent1">
+                <a:shade val="50000"/>
+              </a:schemeClr>
+            </a:lnRef>
+            <a:fillRef idx="1">
+              <a:schemeClr val="accent1"/>
+            </a:fillRef>
+            <a:effectRef idx="0">
+              <a:schemeClr val="accent1"/>
+            </a:effectRef>
+            <a:fontRef idx="minor">
+              <a:schemeClr val="lt1"/>
+            </a:fontRef>
+          </p:style>
+          <p:txBody>
+            <a:bodyPr rtlCol="0" anchor="ctr"/>
+            <a:lstStyle/>
+            <a:p>
+              <a:pPr algn="ctr"/>
+              <a:endParaRPr lang="en-US"/>
+            </a:p>
+          </p:txBody>
+        </p:sp>
+        <p:sp>
+          <p:nvSpPr>
+            <p:cNvPr id="12" name="Ellipse 11"/>
+            <p:cNvSpPr/>
+            <p:nvPr/>
+          </p:nvSpPr>
+          <p:spPr>
+            <a:xfrm>
+              <a:off x="6350232" y="5517232"/>
+              <a:ext cx="216024" cy="144016"/>
+            </a:xfrm>
+            <a:prstGeom prst="ellipse">
+              <a:avLst/>
+            </a:prstGeom>
+            <a:solidFill>
+              <a:srgbClr val="FF0000"/>
+            </a:solidFill>
+            <a:ln>
+              <a:noFill/>
+            </a:ln>
+          </p:spPr>
+          <p:style>
+            <a:lnRef idx="2">
+              <a:schemeClr val="accent1">
+                <a:shade val="50000"/>
+              </a:schemeClr>
+            </a:lnRef>
+            <a:fillRef idx="1">
+              <a:schemeClr val="accent1"/>
+            </a:fillRef>
+            <a:effectRef idx="0">
+              <a:schemeClr val="accent1"/>
+            </a:effectRef>
+            <a:fontRef idx="minor">
+              <a:schemeClr val="lt1"/>
+            </a:fontRef>
+          </p:style>
+          <p:txBody>
+            <a:bodyPr rtlCol="0" anchor="ctr"/>
+            <a:lstStyle/>
+            <a:p>
+              <a:pPr algn="ctr"/>
+              <a:endParaRPr lang="en-US"/>
+            </a:p>
+          </p:txBody>
+        </p:sp>
+        <p:sp>
+          <p:nvSpPr>
+            <p:cNvPr id="13" name="Ellipse 12"/>
+            <p:cNvSpPr/>
+            <p:nvPr/>
+          </p:nvSpPr>
+          <p:spPr>
+            <a:xfrm>
+              <a:off x="6638264" y="5517232"/>
+              <a:ext cx="216024" cy="144016"/>
+            </a:xfrm>
+            <a:prstGeom prst="ellipse">
+              <a:avLst/>
+            </a:prstGeom>
+            <a:solidFill>
+              <a:srgbClr val="FF0000"/>
+            </a:solidFill>
+            <a:ln>
+              <a:noFill/>
+            </a:ln>
+          </p:spPr>
+          <p:style>
+            <a:lnRef idx="2">
+              <a:schemeClr val="accent1">
+                <a:shade val="50000"/>
+              </a:schemeClr>
+            </a:lnRef>
+            <a:fillRef idx="1">
+              <a:schemeClr val="accent1"/>
+            </a:fillRef>
+            <a:effectRef idx="0">
+              <a:schemeClr val="accent1"/>
+            </a:effectRef>
+            <a:fontRef idx="minor">
+              <a:schemeClr val="lt1"/>
+            </a:fontRef>
+          </p:style>
+          <p:txBody>
+            <a:bodyPr rtlCol="0" anchor="ctr"/>
+            <a:lstStyle/>
+            <a:p>
+              <a:pPr algn="ctr"/>
+              <a:endParaRPr lang="en-US"/>
+            </a:p>
+          </p:txBody>
+        </p:sp>
+        <p:sp>
+          <p:nvSpPr>
+            <p:cNvPr id="14" name="Ellipse 13"/>
+            <p:cNvSpPr/>
+            <p:nvPr/>
+          </p:nvSpPr>
+          <p:spPr>
+            <a:xfrm>
+              <a:off x="7214328" y="5517232"/>
+              <a:ext cx="216024" cy="144016"/>
+            </a:xfrm>
+            <a:prstGeom prst="ellipse">
+              <a:avLst/>
+            </a:prstGeom>
+            <a:solidFill>
+              <a:srgbClr val="FF0000"/>
+            </a:solidFill>
+            <a:ln>
+              <a:noFill/>
+            </a:ln>
+          </p:spPr>
+          <p:style>
+            <a:lnRef idx="2">
+              <a:schemeClr val="accent1">
+                <a:shade val="50000"/>
+              </a:schemeClr>
+            </a:lnRef>
+            <a:fillRef idx="1">
+              <a:schemeClr val="accent1"/>
+            </a:fillRef>
+            <a:effectRef idx="0">
+              <a:schemeClr val="accent1"/>
+            </a:effectRef>
+            <a:fontRef idx="minor">
+              <a:schemeClr val="lt1"/>
+            </a:fontRef>
+          </p:style>
+          <p:txBody>
+            <a:bodyPr rtlCol="0" anchor="ctr"/>
+            <a:lstStyle/>
+            <a:p>
+              <a:pPr algn="ctr"/>
+              <a:endParaRPr lang="en-US"/>
+            </a:p>
+          </p:txBody>
+        </p:sp>
+        <p:sp>
+          <p:nvSpPr>
+            <p:cNvPr id="15" name="Ellipse 14"/>
+            <p:cNvSpPr/>
+            <p:nvPr/>
+          </p:nvSpPr>
+          <p:spPr>
+            <a:xfrm>
+              <a:off x="7790392" y="5517232"/>
+              <a:ext cx="216024" cy="144016"/>
+            </a:xfrm>
+            <a:prstGeom prst="ellipse">
+              <a:avLst/>
+            </a:prstGeom>
+            <a:solidFill>
+              <a:srgbClr val="FF0000"/>
+            </a:solidFill>
+            <a:ln>
+              <a:noFill/>
+            </a:ln>
+          </p:spPr>
+          <p:style>
+            <a:lnRef idx="2">
+              <a:schemeClr val="accent1">
+                <a:shade val="50000"/>
+              </a:schemeClr>
+            </a:lnRef>
+            <a:fillRef idx="1">
+              <a:schemeClr val="accent1"/>
+            </a:fillRef>
+            <a:effectRef idx="0">
+              <a:schemeClr val="accent1"/>
+            </a:effectRef>
+            <a:fontRef idx="minor">
+              <a:schemeClr val="lt1"/>
+            </a:fontRef>
+          </p:style>
+          <p:txBody>
+            <a:bodyPr rtlCol="0" anchor="ctr"/>
+            <a:lstStyle/>
+            <a:p>
+              <a:pPr algn="ctr"/>
+              <a:endParaRPr lang="en-US"/>
+            </a:p>
+          </p:txBody>
+        </p:sp>
+        <p:sp>
+          <p:nvSpPr>
+            <p:cNvPr id="16" name="Rectangle 15"/>
+            <p:cNvSpPr/>
+            <p:nvPr/>
+          </p:nvSpPr>
+          <p:spPr>
+            <a:xfrm>
+              <a:off x="5846176" y="5327497"/>
+              <a:ext cx="2232248" cy="45719"/>
+            </a:xfrm>
+            <a:prstGeom prst="rect">
+              <a:avLst/>
+            </a:prstGeom>
+            <a:solidFill>
+              <a:srgbClr val="FFFF00"/>
+            </a:solidFill>
+            <a:ln>
+              <a:noFill/>
+            </a:ln>
+          </p:spPr>
+          <p:style>
+            <a:lnRef idx="2">
+              <a:schemeClr val="accent1">
+                <a:shade val="50000"/>
+              </a:schemeClr>
+            </a:lnRef>
+            <a:fillRef idx="1">
+              <a:schemeClr val="accent1"/>
+            </a:fillRef>
+            <a:effectRef idx="0">
+              <a:schemeClr val="accent1"/>
+            </a:effectRef>
+            <a:fontRef idx="minor">
+              <a:schemeClr val="lt1"/>
+            </a:fontRef>
+          </p:style>
+          <p:txBody>
+            <a:bodyPr rtlCol="0" anchor="ctr"/>
+            <a:lstStyle/>
+            <a:p>
+              <a:pPr algn="ctr"/>
+              <a:endParaRPr lang="en-US"/>
+            </a:p>
+          </p:txBody>
+        </p:sp>
+        <p:cxnSp>
+          <p:nvCxnSpPr>
+            <p:cNvPr id="17" name="Connecteur droit 16"/>
+            <p:cNvCxnSpPr/>
+            <p:nvPr/>
+          </p:nvCxnSpPr>
+          <p:spPr>
+            <a:xfrm flipV="1">
+              <a:off x="5835948" y="5374170"/>
+              <a:ext cx="10228" cy="945022"/>
+            </a:xfrm>
+            <a:prstGeom prst="line">
+              <a:avLst/>
+            </a:prstGeom>
+          </p:spPr>
+          <p:style>
+            <a:lnRef idx="1">
+              <a:schemeClr val="accent2"/>
+            </a:lnRef>
+            <a:fillRef idx="0">
+              <a:schemeClr val="accent2"/>
+            </a:fillRef>
+            <a:effectRef idx="0">
+              <a:schemeClr val="accent2"/>
+            </a:effectRef>
+            <a:fontRef idx="minor">
+              <a:schemeClr val="tx1"/>
+            </a:fontRef>
+          </p:style>
+        </p:cxnSp>
+        <p:cxnSp>
+          <p:nvCxnSpPr>
+            <p:cNvPr id="18" name="Connecteur droit 17"/>
+            <p:cNvCxnSpPr/>
+            <p:nvPr/>
+          </p:nvCxnSpPr>
+          <p:spPr>
+            <a:xfrm flipV="1">
+              <a:off x="8078425" y="5371313"/>
+              <a:ext cx="0" cy="947879"/>
+            </a:xfrm>
+            <a:prstGeom prst="line">
+              <a:avLst/>
+            </a:prstGeom>
+          </p:spPr>
+          <p:style>
+            <a:lnRef idx="1">
+              <a:schemeClr val="accent2"/>
+            </a:lnRef>
+            <a:fillRef idx="0">
+              <a:schemeClr val="accent2"/>
+            </a:fillRef>
+            <a:effectRef idx="0">
+              <a:schemeClr val="accent2"/>
+            </a:effectRef>
+            <a:fontRef idx="minor">
+              <a:schemeClr val="tx1"/>
+            </a:fontRef>
+          </p:style>
+        </p:cxnSp>
+        <p:cxnSp>
+          <p:nvCxnSpPr>
+            <p:cNvPr id="19" name="Connecteur droit 18"/>
+            <p:cNvCxnSpPr/>
+            <p:nvPr/>
+          </p:nvCxnSpPr>
+          <p:spPr>
+            <a:xfrm>
+              <a:off x="5846176" y="5373216"/>
+              <a:ext cx="2232248" cy="0"/>
+            </a:xfrm>
+            <a:prstGeom prst="line">
+              <a:avLst/>
+            </a:prstGeom>
+          </p:spPr>
+          <p:style>
+            <a:lnRef idx="1">
+              <a:schemeClr val="accent2"/>
+            </a:lnRef>
+            <a:fillRef idx="0">
+              <a:schemeClr val="accent2"/>
+            </a:fillRef>
+            <a:effectRef idx="0">
+              <a:schemeClr val="accent2"/>
+            </a:effectRef>
+            <a:fontRef idx="minor">
+              <a:schemeClr val="tx1"/>
+            </a:fontRef>
+          </p:style>
+        </p:cxnSp>
+        <p:sp>
+          <p:nvSpPr>
+            <p:cNvPr id="20" name="Rectangle 19"/>
+            <p:cNvSpPr/>
+            <p:nvPr/>
+          </p:nvSpPr>
+          <p:spPr>
+            <a:xfrm>
+              <a:off x="5776909" y="5901811"/>
+              <a:ext cx="697772" cy="294924"/>
+            </a:xfrm>
+            <a:prstGeom prst="rect">
+              <a:avLst/>
+            </a:prstGeom>
+          </p:spPr>
+          <p:txBody>
+            <a:bodyPr wrap="none">
+              <a:spAutoFit/>
+            </a:bodyPr>
+            <a:lstStyle/>
+            <a:p>
+              <a:r>
+                <a:rPr lang="en-US" sz="1200" dirty="0">
+                  <a:latin typeface="Times New Roman" panose="02020603050405020304" pitchFamily="18" charset="0"/>
+                  <a:cs typeface="Times New Roman" panose="02020603050405020304" pitchFamily="18" charset="0"/>
+                </a:rPr>
+                <a:t>p-</a:t>
+              </a:r>
+              <a:r>
+                <a:rPr lang="en-US" sz="1200" dirty="0" err="1">
+                  <a:latin typeface="Times New Roman" panose="02020603050405020304" pitchFamily="18" charset="0"/>
+                  <a:cs typeface="Times New Roman" panose="02020603050405020304" pitchFamily="18" charset="0"/>
+                </a:rPr>
+                <a:t>ZnTe</a:t>
+              </a:r>
+              <a:endParaRPr lang="en-US" sz="1200" dirty="0">
+                <a:latin typeface="Times New Roman" panose="02020603050405020304" pitchFamily="18" charset="0"/>
+                <a:cs typeface="Times New Roman" panose="02020603050405020304" pitchFamily="18" charset="0"/>
+              </a:endParaRPr>
+            </a:p>
+          </p:txBody>
+        </p:sp>
+        <p:sp>
+          <p:nvSpPr>
+            <p:cNvPr id="21" name="Rectangle 20"/>
+            <p:cNvSpPr/>
+            <p:nvPr/>
+          </p:nvSpPr>
+          <p:spPr>
+            <a:xfrm>
+              <a:off x="5801493" y="5504396"/>
+              <a:ext cx="660909" cy="294924"/>
+            </a:xfrm>
+            <a:prstGeom prst="rect">
+              <a:avLst/>
+            </a:prstGeom>
+          </p:spPr>
+          <p:txBody>
+            <a:bodyPr wrap="none">
+              <a:spAutoFit/>
+            </a:bodyPr>
+            <a:lstStyle/>
+            <a:p>
+              <a:r>
+                <a:rPr lang="en-US" sz="1200" dirty="0" err="1" smtClean="0">
+                  <a:latin typeface="Times New Roman" panose="02020603050405020304" pitchFamily="18" charset="0"/>
+                  <a:cs typeface="Times New Roman" panose="02020603050405020304" pitchFamily="18" charset="0"/>
+                </a:rPr>
+                <a:t>i-ZnTe</a:t>
+              </a:r>
+              <a:endParaRPr lang="en-US" sz="1200" dirty="0">
+                <a:latin typeface="Times New Roman" panose="02020603050405020304" pitchFamily="18" charset="0"/>
+                <a:cs typeface="Times New Roman" panose="02020603050405020304" pitchFamily="18" charset="0"/>
+              </a:endParaRPr>
+            </a:p>
+          </p:txBody>
+        </p:sp>
+        <p:sp>
+          <p:nvSpPr>
+            <p:cNvPr id="22" name="Rectangle 21"/>
+            <p:cNvSpPr/>
+            <p:nvPr/>
+          </p:nvSpPr>
+          <p:spPr>
+            <a:xfrm>
+              <a:off x="4660717" y="4709567"/>
+              <a:ext cx="1554192" cy="509589"/>
+            </a:xfrm>
+            <a:prstGeom prst="rect">
+              <a:avLst/>
+            </a:prstGeom>
+          </p:spPr>
+          <p:txBody>
+            <a:bodyPr wrap="square">
+              <a:spAutoFit/>
+            </a:bodyPr>
+            <a:lstStyle/>
+            <a:p>
+              <a:r>
+                <a:rPr lang="en-US" sz="1200" dirty="0" smtClean="0">
+                  <a:latin typeface="Times New Roman" panose="02020603050405020304" pitchFamily="18" charset="0"/>
+                  <a:cs typeface="Times New Roman" panose="02020603050405020304" pitchFamily="18" charset="0"/>
+                </a:rPr>
+                <a:t>Au (</a:t>
+              </a:r>
+              <a:r>
+                <a:rPr lang="en-US" sz="1200" dirty="0">
+                  <a:latin typeface="Times New Roman" panose="02020603050405020304" pitchFamily="18" charset="0"/>
+                  <a:cs typeface="Times New Roman" panose="02020603050405020304" pitchFamily="18" charset="0"/>
+                </a:rPr>
+                <a:t>6 </a:t>
+              </a:r>
+              <a:r>
+                <a:rPr lang="en-US" sz="1200" dirty="0" smtClean="0">
+                  <a:latin typeface="Times New Roman" panose="02020603050405020304" pitchFamily="18" charset="0"/>
+                  <a:cs typeface="Times New Roman" panose="02020603050405020304" pitchFamily="18" charset="0"/>
+                </a:rPr>
+                <a:t>nm)</a:t>
+              </a:r>
+              <a:endParaRPr lang="en-US" sz="1200" dirty="0">
+                <a:latin typeface="Times New Roman" panose="02020603050405020304" pitchFamily="18" charset="0"/>
+                <a:cs typeface="Times New Roman" panose="02020603050405020304" pitchFamily="18" charset="0"/>
+              </a:endParaRPr>
+            </a:p>
+          </p:txBody>
+        </p:sp>
+        <p:pic>
+          <p:nvPicPr>
+            <p:cNvPr id="23" name="Image 22" descr="Image3.png"/>
+            <p:cNvPicPr>
+              <a:picLocks noChangeAspect="1"/>
+            </p:cNvPicPr>
+            <p:nvPr/>
+          </p:nvPicPr>
+          <p:blipFill>
+            <a:blip r:embed="rId7" cstate="print"/>
+            <a:srcRect b="48823"/>
+            <a:stretch>
+              <a:fillRect/>
+            </a:stretch>
+          </p:blipFill>
+          <p:spPr>
+            <a:xfrm>
+              <a:off x="5870644" y="4725144"/>
+              <a:ext cx="1919748" cy="602353"/>
+            </a:xfrm>
+            <a:prstGeom prst="rect">
+              <a:avLst/>
+            </a:prstGeom>
+          </p:spPr>
+        </p:pic>
+        <p:sp>
+          <p:nvSpPr>
+            <p:cNvPr id="24" name="Rectangle 23"/>
+            <p:cNvSpPr/>
+            <p:nvPr/>
+          </p:nvSpPr>
+          <p:spPr>
+            <a:xfrm>
+              <a:off x="6035596" y="4944529"/>
+              <a:ext cx="455022" cy="294924"/>
+            </a:xfrm>
+            <a:prstGeom prst="rect">
+              <a:avLst/>
+            </a:prstGeom>
+          </p:spPr>
+          <p:txBody>
+            <a:bodyPr wrap="none">
+              <a:spAutoFit/>
+            </a:bodyPr>
+            <a:lstStyle/>
+            <a:p>
+              <a:r>
+                <a:rPr lang="en-US" sz="1200" dirty="0" smtClean="0">
+                  <a:latin typeface="Times New Roman" panose="02020603050405020304" pitchFamily="18" charset="0"/>
+                  <a:cs typeface="Times New Roman" panose="02020603050405020304" pitchFamily="18" charset="0"/>
+                </a:rPr>
+                <a:t>SIL</a:t>
+              </a:r>
+              <a:endParaRPr lang="en-US" sz="1200" dirty="0">
+                <a:latin typeface="Times New Roman" panose="02020603050405020304" pitchFamily="18" charset="0"/>
+                <a:cs typeface="Times New Roman" panose="02020603050405020304" pitchFamily="18" charset="0"/>
+              </a:endParaRPr>
+            </a:p>
+          </p:txBody>
+        </p:sp>
+        <p:sp>
+          <p:nvSpPr>
+            <p:cNvPr id="25" name="Ellipse 24"/>
+            <p:cNvSpPr/>
+            <p:nvPr/>
+          </p:nvSpPr>
+          <p:spPr>
+            <a:xfrm>
+              <a:off x="8510473" y="5741021"/>
+              <a:ext cx="432047" cy="406282"/>
+            </a:xfrm>
+            <a:prstGeom prst="ellipse">
+              <a:avLst/>
+            </a:prstGeom>
+          </p:spPr>
+          <p:style>
+            <a:lnRef idx="2">
+              <a:schemeClr val="accent6"/>
+            </a:lnRef>
+            <a:fillRef idx="1">
+              <a:schemeClr val="lt1"/>
+            </a:fillRef>
+            <a:effectRef idx="0">
+              <a:schemeClr val="accent6"/>
+            </a:effectRef>
+            <a:fontRef idx="minor">
+              <a:schemeClr val="dk1"/>
+            </a:fontRef>
+          </p:style>
+          <p:txBody>
+            <a:bodyPr rtlCol="0" anchor="ctr"/>
+            <a:lstStyle/>
+            <a:p>
+              <a:pPr algn="ctr"/>
+              <a:endParaRPr lang="en-US"/>
+            </a:p>
+          </p:txBody>
+        </p:sp>
+        <p:cxnSp>
+          <p:nvCxnSpPr>
+            <p:cNvPr id="26" name="Connecteur droit 25"/>
+            <p:cNvCxnSpPr/>
+            <p:nvPr/>
+          </p:nvCxnSpPr>
+          <p:spPr>
+            <a:xfrm flipV="1">
+              <a:off x="7898404" y="4869160"/>
+              <a:ext cx="0" cy="453384"/>
+            </a:xfrm>
+            <a:prstGeom prst="line">
+              <a:avLst/>
+            </a:prstGeom>
+            <a:ln>
+              <a:solidFill>
+                <a:srgbClr val="0070C0"/>
+              </a:solidFill>
+            </a:ln>
+          </p:spPr>
+          <p:style>
+            <a:lnRef idx="1">
+              <a:schemeClr val="accent1"/>
+            </a:lnRef>
+            <a:fillRef idx="0">
+              <a:schemeClr val="accent1"/>
+            </a:fillRef>
+            <a:effectRef idx="0">
+              <a:schemeClr val="accent1"/>
+            </a:effectRef>
+            <a:fontRef idx="minor">
+              <a:schemeClr val="tx1"/>
+            </a:fontRef>
+          </p:style>
+        </p:cxnSp>
+        <p:cxnSp>
+          <p:nvCxnSpPr>
+            <p:cNvPr id="27" name="Connecteur droit 26"/>
+            <p:cNvCxnSpPr/>
+            <p:nvPr/>
+          </p:nvCxnSpPr>
+          <p:spPr>
+            <a:xfrm>
+              <a:off x="7898404" y="4869160"/>
+              <a:ext cx="828092" cy="0"/>
+            </a:xfrm>
+            <a:prstGeom prst="line">
+              <a:avLst/>
+            </a:prstGeom>
+            <a:ln>
+              <a:solidFill>
+                <a:srgbClr val="0070C0"/>
+              </a:solidFill>
+            </a:ln>
+          </p:spPr>
+          <p:style>
+            <a:lnRef idx="1">
+              <a:schemeClr val="accent1"/>
+            </a:lnRef>
+            <a:fillRef idx="0">
+              <a:schemeClr val="accent1"/>
+            </a:fillRef>
+            <a:effectRef idx="0">
+              <a:schemeClr val="accent1"/>
+            </a:effectRef>
+            <a:fontRef idx="minor">
+              <a:schemeClr val="tx1"/>
+            </a:fontRef>
+          </p:style>
+        </p:cxnSp>
+        <p:cxnSp>
+          <p:nvCxnSpPr>
+            <p:cNvPr id="28" name="Connecteur droit 27"/>
+            <p:cNvCxnSpPr>
+              <a:endCxn id="25" idx="0"/>
+            </p:cNvCxnSpPr>
+            <p:nvPr/>
+          </p:nvCxnSpPr>
+          <p:spPr>
+            <a:xfrm>
+              <a:off x="8726496" y="4869161"/>
+              <a:ext cx="0" cy="871860"/>
+            </a:xfrm>
+            <a:prstGeom prst="line">
+              <a:avLst/>
+            </a:prstGeom>
+            <a:ln>
+              <a:solidFill>
+                <a:srgbClr val="0070C0"/>
+              </a:solidFill>
+            </a:ln>
+          </p:spPr>
+          <p:style>
+            <a:lnRef idx="1">
+              <a:schemeClr val="accent1"/>
+            </a:lnRef>
+            <a:fillRef idx="0">
+              <a:schemeClr val="accent1"/>
+            </a:fillRef>
+            <a:effectRef idx="0">
+              <a:schemeClr val="accent1"/>
+            </a:effectRef>
+            <a:fontRef idx="minor">
+              <a:schemeClr val="tx1"/>
+            </a:fontRef>
+          </p:style>
+        </p:cxnSp>
+        <p:cxnSp>
+          <p:nvCxnSpPr>
+            <p:cNvPr id="29" name="Connecteur droit 28"/>
+            <p:cNvCxnSpPr>
+              <a:stCxn id="25" idx="4"/>
+            </p:cNvCxnSpPr>
+            <p:nvPr/>
+          </p:nvCxnSpPr>
+          <p:spPr>
+            <a:xfrm>
+              <a:off x="8726496" y="6147303"/>
+              <a:ext cx="0" cy="594065"/>
+            </a:xfrm>
+            <a:prstGeom prst="line">
+              <a:avLst/>
+            </a:prstGeom>
+            <a:ln>
+              <a:solidFill>
+                <a:srgbClr val="0070C0"/>
+              </a:solidFill>
+            </a:ln>
+          </p:spPr>
+          <p:style>
+            <a:lnRef idx="1">
+              <a:schemeClr val="accent1"/>
+            </a:lnRef>
+            <a:fillRef idx="0">
+              <a:schemeClr val="accent1"/>
+            </a:fillRef>
+            <a:effectRef idx="0">
+              <a:schemeClr val="accent1"/>
+            </a:effectRef>
+            <a:fontRef idx="minor">
+              <a:schemeClr val="tx1"/>
+            </a:fontRef>
+          </p:style>
+        </p:cxnSp>
+        <p:cxnSp>
+          <p:nvCxnSpPr>
+            <p:cNvPr id="30" name="Connecteur droit 29"/>
+            <p:cNvCxnSpPr/>
+            <p:nvPr/>
+          </p:nvCxnSpPr>
+          <p:spPr>
+            <a:xfrm>
+              <a:off x="7898404" y="6319192"/>
+              <a:ext cx="0" cy="422176"/>
+            </a:xfrm>
+            <a:prstGeom prst="line">
+              <a:avLst/>
+            </a:prstGeom>
+            <a:ln>
+              <a:solidFill>
+                <a:srgbClr val="0070C0"/>
+              </a:solidFill>
+            </a:ln>
+          </p:spPr>
+          <p:style>
+            <a:lnRef idx="1">
+              <a:schemeClr val="accent1"/>
+            </a:lnRef>
+            <a:fillRef idx="0">
+              <a:schemeClr val="accent1"/>
+            </a:fillRef>
+            <a:effectRef idx="0">
+              <a:schemeClr val="accent1"/>
+            </a:effectRef>
+            <a:fontRef idx="minor">
+              <a:schemeClr val="tx1"/>
+            </a:fontRef>
+          </p:style>
+        </p:cxnSp>
+        <p:cxnSp>
+          <p:nvCxnSpPr>
+            <p:cNvPr id="31" name="Connecteur droit 30"/>
+            <p:cNvCxnSpPr/>
+            <p:nvPr/>
+          </p:nvCxnSpPr>
+          <p:spPr>
+            <a:xfrm>
+              <a:off x="7898404" y="6741368"/>
+              <a:ext cx="828092" cy="0"/>
+            </a:xfrm>
+            <a:prstGeom prst="line">
+              <a:avLst/>
+            </a:prstGeom>
+            <a:ln>
+              <a:solidFill>
+                <a:srgbClr val="0070C0"/>
+              </a:solidFill>
+            </a:ln>
+          </p:spPr>
+          <p:style>
+            <a:lnRef idx="1">
+              <a:schemeClr val="accent1"/>
+            </a:lnRef>
+            <a:fillRef idx="0">
+              <a:schemeClr val="accent1"/>
+            </a:fillRef>
+            <a:effectRef idx="0">
+              <a:schemeClr val="accent1"/>
+            </a:effectRef>
+            <a:fontRef idx="minor">
+              <a:schemeClr val="tx1"/>
+            </a:fontRef>
+          </p:style>
+        </p:cxnSp>
+        <p:sp>
+          <p:nvSpPr>
+            <p:cNvPr id="32" name="Rectangle 31"/>
+            <p:cNvSpPr/>
+            <p:nvPr/>
+          </p:nvSpPr>
+          <p:spPr>
+            <a:xfrm>
+              <a:off x="8461184" y="5675405"/>
+              <a:ext cx="351449" cy="358879"/>
+            </a:xfrm>
+            <a:prstGeom prst="rect">
+              <a:avLst/>
+            </a:prstGeom>
+            <a:ln>
+              <a:noFill/>
+            </a:ln>
+          </p:spPr>
+          <p:txBody>
+            <a:bodyPr wrap="none">
+              <a:spAutoFit/>
+            </a:bodyPr>
+            <a:lstStyle/>
+            <a:p>
+              <a:r>
+                <a:rPr lang="en-US" sz="1600" dirty="0" smtClean="0"/>
+                <a:t>V</a:t>
+              </a:r>
+              <a:endParaRPr lang="en-US" sz="1600" dirty="0"/>
+            </a:p>
+          </p:txBody>
+        </p:sp>
+        <p:sp>
+          <p:nvSpPr>
+            <p:cNvPr id="33" name="Rectangle 32"/>
+            <p:cNvSpPr/>
+            <p:nvPr/>
+          </p:nvSpPr>
+          <p:spPr>
+            <a:xfrm>
+              <a:off x="4916047" y="5239453"/>
+              <a:ext cx="566111" cy="294924"/>
+            </a:xfrm>
+            <a:prstGeom prst="rect">
+              <a:avLst/>
+            </a:prstGeom>
+          </p:spPr>
+          <p:txBody>
+            <a:bodyPr wrap="none">
+              <a:spAutoFit/>
+            </a:bodyPr>
+            <a:lstStyle/>
+            <a:p>
+              <a:r>
+                <a:rPr lang="en-US" sz="1200" dirty="0" err="1" smtClean="0">
+                  <a:latin typeface="Times New Roman" panose="02020603050405020304" pitchFamily="18" charset="0"/>
+                  <a:cs typeface="Times New Roman" panose="02020603050405020304" pitchFamily="18" charset="0"/>
+                </a:rPr>
+                <a:t>CdTe</a:t>
+              </a:r>
+              <a:endParaRPr lang="en-US" sz="1200" dirty="0">
+                <a:latin typeface="Times New Roman" panose="02020603050405020304" pitchFamily="18" charset="0"/>
+                <a:cs typeface="Times New Roman" panose="02020603050405020304" pitchFamily="18" charset="0"/>
+              </a:endParaRPr>
+            </a:p>
+          </p:txBody>
+        </p:sp>
+      </p:grpSp>
+      <p:cxnSp>
+        <p:nvCxnSpPr>
+          <p:cNvPr id="3" name="Connecteur droit 2"/>
+          <p:cNvCxnSpPr>
+            <a:stCxn id="22" idx="2"/>
+            <a:endCxn id="16" idx="1"/>
+          </p:cNvCxnSpPr>
+          <p:nvPr/>
+        </p:nvCxnSpPr>
+        <p:spPr>
+          <a:xfrm>
+            <a:off x="7163057" y="3529211"/>
+            <a:ext cx="226393" cy="71317"/>
+          </a:xfrm>
+          <a:prstGeom prst="line">
+            <a:avLst/>
+          </a:prstGeom>
+          <a:ln>
+            <a:solidFill>
+              <a:schemeClr val="tx1"/>
+            </a:solidFill>
+          </a:ln>
+        </p:spPr>
+        <p:style>
+          <a:lnRef idx="1">
+            <a:schemeClr val="accent1"/>
+          </a:lnRef>
+          <a:fillRef idx="0">
+            <a:schemeClr val="accent1"/>
+          </a:fillRef>
+          <a:effectRef idx="0">
+            <a:schemeClr val="accent1"/>
+          </a:effectRef>
+          <a:fontRef idx="minor">
+            <a:schemeClr val="tx1"/>
+          </a:fontRef>
+        </p:style>
+      </p:cxnSp>
+      <p:sp>
+        <p:nvSpPr>
+          <p:cNvPr id="36" name="ZoneTexte 35"/>
+          <p:cNvSpPr txBox="1"/>
+          <p:nvPr/>
+        </p:nvSpPr>
+        <p:spPr>
+          <a:xfrm>
+            <a:off x="7003286" y="2844477"/>
+            <a:ext cx="377026" cy="369332"/>
+          </a:xfrm>
+          <a:prstGeom prst="rect">
+            <a:avLst/>
+          </a:prstGeom>
+          <a:noFill/>
+        </p:spPr>
+        <p:txBody>
+          <a:bodyPr wrap="none" rtlCol="0">
+            <a:spAutoFit/>
+          </a:bodyPr>
+          <a:lstStyle/>
+          <a:p>
+            <a:r>
+              <a:rPr lang="fr-FR" dirty="0">
+                <a:latin typeface="Times New Roman" pitchFamily="18" charset="0"/>
+                <a:cs typeface="Times New Roman" pitchFamily="18" charset="0"/>
+              </a:rPr>
+              <a:t>d</a:t>
+            </a:r>
+            <a:r>
+              <a:rPr lang="fr-FR" dirty="0" smtClean="0">
+                <a:latin typeface="Times New Roman" pitchFamily="18" charset="0"/>
+                <a:cs typeface="Times New Roman" pitchFamily="18" charset="0"/>
+              </a:rPr>
+              <a:t>)</a:t>
             </a:r>
             <a:endParaRPr lang="fr-FR" dirty="0">
               <a:latin typeface="Times New Roman" pitchFamily="18" charset="0"/>

</xml_diff>

<commit_message>
Chap02: Correction done minus conclusion
</commit_message>
<xml_diff>
--- a/02-GrowthQDs/Pictures/MapEfield.pptx
+++ b/02-GrowthQDs/Pictures/MapEfield.pptx
@@ -288,7 +288,7 @@
           <a:p>
             <a:fld id="{3188249C-4BA3-4338-8D91-035235D4C769}" type="datetimeFigureOut">
               <a:rPr lang="fr-FR" smtClean="0"/>
-              <a:t>13/09/2017</a:t>
+              <a:t>22/09/2017</a:t>
             </a:fld>
             <a:endParaRPr lang="fr-FR"/>
           </a:p>
@@ -458,7 +458,7 @@
           <a:p>
             <a:fld id="{3188249C-4BA3-4338-8D91-035235D4C769}" type="datetimeFigureOut">
               <a:rPr lang="fr-FR" smtClean="0"/>
-              <a:t>13/09/2017</a:t>
+              <a:t>22/09/2017</a:t>
             </a:fld>
             <a:endParaRPr lang="fr-FR"/>
           </a:p>
@@ -638,7 +638,7 @@
           <a:p>
             <a:fld id="{3188249C-4BA3-4338-8D91-035235D4C769}" type="datetimeFigureOut">
               <a:rPr lang="fr-FR" smtClean="0"/>
-              <a:t>13/09/2017</a:t>
+              <a:t>22/09/2017</a:t>
             </a:fld>
             <a:endParaRPr lang="fr-FR"/>
           </a:p>
@@ -808,7 +808,7 @@
           <a:p>
             <a:fld id="{3188249C-4BA3-4338-8D91-035235D4C769}" type="datetimeFigureOut">
               <a:rPr lang="fr-FR" smtClean="0"/>
-              <a:t>13/09/2017</a:t>
+              <a:t>22/09/2017</a:t>
             </a:fld>
             <a:endParaRPr lang="fr-FR"/>
           </a:p>
@@ -1054,7 +1054,7 @@
           <a:p>
             <a:fld id="{3188249C-4BA3-4338-8D91-035235D4C769}" type="datetimeFigureOut">
               <a:rPr lang="fr-FR" smtClean="0"/>
-              <a:t>13/09/2017</a:t>
+              <a:t>22/09/2017</a:t>
             </a:fld>
             <a:endParaRPr lang="fr-FR"/>
           </a:p>
@@ -1342,7 +1342,7 @@
           <a:p>
             <a:fld id="{3188249C-4BA3-4338-8D91-035235D4C769}" type="datetimeFigureOut">
               <a:rPr lang="fr-FR" smtClean="0"/>
-              <a:t>13/09/2017</a:t>
+              <a:t>22/09/2017</a:t>
             </a:fld>
             <a:endParaRPr lang="fr-FR"/>
           </a:p>
@@ -1764,7 +1764,7 @@
           <a:p>
             <a:fld id="{3188249C-4BA3-4338-8D91-035235D4C769}" type="datetimeFigureOut">
               <a:rPr lang="fr-FR" smtClean="0"/>
-              <a:t>13/09/2017</a:t>
+              <a:t>22/09/2017</a:t>
             </a:fld>
             <a:endParaRPr lang="fr-FR"/>
           </a:p>
@@ -1882,7 +1882,7 @@
           <a:p>
             <a:fld id="{3188249C-4BA3-4338-8D91-035235D4C769}" type="datetimeFigureOut">
               <a:rPr lang="fr-FR" smtClean="0"/>
-              <a:t>13/09/2017</a:t>
+              <a:t>22/09/2017</a:t>
             </a:fld>
             <a:endParaRPr lang="fr-FR"/>
           </a:p>
@@ -1977,7 +1977,7 @@
           <a:p>
             <a:fld id="{3188249C-4BA3-4338-8D91-035235D4C769}" type="datetimeFigureOut">
               <a:rPr lang="fr-FR" smtClean="0"/>
-              <a:t>13/09/2017</a:t>
+              <a:t>22/09/2017</a:t>
             </a:fld>
             <a:endParaRPr lang="fr-FR"/>
           </a:p>
@@ -2254,7 +2254,7 @@
           <a:p>
             <a:fld id="{3188249C-4BA3-4338-8D91-035235D4C769}" type="datetimeFigureOut">
               <a:rPr lang="fr-FR" smtClean="0"/>
-              <a:t>13/09/2017</a:t>
+              <a:t>22/09/2017</a:t>
             </a:fld>
             <a:endParaRPr lang="fr-FR"/>
           </a:p>
@@ -2507,7 +2507,7 @@
           <a:p>
             <a:fld id="{3188249C-4BA3-4338-8D91-035235D4C769}" type="datetimeFigureOut">
               <a:rPr lang="fr-FR" smtClean="0"/>
-              <a:t>13/09/2017</a:t>
+              <a:t>22/09/2017</a:t>
             </a:fld>
             <a:endParaRPr lang="fr-FR"/>
           </a:p>
@@ -2720,7 +2720,7 @@
           <a:p>
             <a:fld id="{3188249C-4BA3-4338-8D91-035235D4C769}" type="datetimeFigureOut">
               <a:rPr lang="fr-FR" smtClean="0"/>
-              <a:t>13/09/2017</a:t>
+              <a:t>22/09/2017</a:t>
             </a:fld>
             <a:endParaRPr lang="fr-FR"/>
           </a:p>
@@ -3359,6 +3359,78 @@
           </a:p>
         </p:txBody>
       </p:sp>
+      <p:sp>
+        <p:nvSpPr>
+          <p:cNvPr id="8" name="ZoneTexte 7"/>
+          <p:cNvSpPr txBox="1"/>
+          <p:nvPr/>
+        </p:nvSpPr>
+        <p:spPr>
+          <a:xfrm>
+            <a:off x="-36512" y="6073303"/>
+            <a:ext cx="526106" cy="461665"/>
+          </a:xfrm>
+          <a:prstGeom prst="rect">
+            <a:avLst/>
+          </a:prstGeom>
+          <a:noFill/>
+        </p:spPr>
+        <p:txBody>
+          <a:bodyPr wrap="none" rtlCol="0">
+            <a:spAutoFit/>
+          </a:bodyPr>
+          <a:lstStyle/>
+          <a:p>
+            <a:r>
+              <a:rPr lang="fr-FR" sz="2400" dirty="0" smtClean="0">
+                <a:latin typeface="Times New Roman" panose="02020603050405020304" pitchFamily="18" charset="0"/>
+                <a:cs typeface="Times New Roman" panose="02020603050405020304" pitchFamily="18" charset="0"/>
+              </a:rPr>
+              <a:t>(c)</a:t>
+            </a:r>
+            <a:endParaRPr lang="fr-FR" sz="2400" dirty="0">
+              <a:latin typeface="Times New Roman" panose="02020603050405020304" pitchFamily="18" charset="0"/>
+              <a:cs typeface="Times New Roman" panose="02020603050405020304" pitchFamily="18" charset="0"/>
+            </a:endParaRPr>
+          </a:p>
+        </p:txBody>
+      </p:sp>
+      <p:sp>
+        <p:nvSpPr>
+          <p:cNvPr id="9" name="ZoneTexte 8"/>
+          <p:cNvSpPr txBox="1"/>
+          <p:nvPr/>
+        </p:nvSpPr>
+        <p:spPr>
+          <a:xfrm>
+            <a:off x="-36512" y="8737599"/>
+            <a:ext cx="543739" cy="461665"/>
+          </a:xfrm>
+          <a:prstGeom prst="rect">
+            <a:avLst/>
+          </a:prstGeom>
+          <a:noFill/>
+        </p:spPr>
+        <p:txBody>
+          <a:bodyPr wrap="none" rtlCol="0">
+            <a:spAutoFit/>
+          </a:bodyPr>
+          <a:lstStyle/>
+          <a:p>
+            <a:r>
+              <a:rPr lang="fr-FR" sz="2400" dirty="0" smtClean="0">
+                <a:latin typeface="Times New Roman" panose="02020603050405020304" pitchFamily="18" charset="0"/>
+                <a:cs typeface="Times New Roman" panose="02020603050405020304" pitchFamily="18" charset="0"/>
+              </a:rPr>
+              <a:t>(d)</a:t>
+            </a:r>
+            <a:endParaRPr lang="fr-FR" sz="2400" dirty="0">
+              <a:latin typeface="Times New Roman" panose="02020603050405020304" pitchFamily="18" charset="0"/>
+              <a:cs typeface="Times New Roman" panose="02020603050405020304" pitchFamily="18" charset="0"/>
+            </a:endParaRPr>
+          </a:p>
+        </p:txBody>
+      </p:sp>
     </p:spTree>
     <p:extLst>
       <p:ext uri="{BB962C8B-B14F-4D97-AF65-F5344CB8AC3E}">

</xml_diff>